<commit_message>
update@0408, ppt and tex module
</commit_message>
<xml_diff>
--- a/ZhangJihua-weekly-report.pptx
+++ b/ZhangJihua-weekly-report.pptx
@@ -5,10 +5,10 @@
     <p:sldMasterId id="2147483648" r:id="rId1"/>
   </p:sldMasterIdLst>
   <p:notesMasterIdLst>
-    <p:notesMasterId r:id="rId14"/>
+    <p:notesMasterId r:id="rId18"/>
   </p:notesMasterIdLst>
   <p:handoutMasterIdLst>
-    <p:handoutMasterId r:id="rId15"/>
+    <p:handoutMasterId r:id="rId19"/>
   </p:handoutMasterIdLst>
   <p:sldIdLst>
     <p:sldId id="260" r:id="rId2"/>
@@ -23,6 +23,10 @@
     <p:sldId id="266" r:id="rId11"/>
     <p:sldId id="268" r:id="rId12"/>
     <p:sldId id="267" r:id="rId13"/>
+    <p:sldId id="269" r:id="rId14"/>
+    <p:sldId id="270" r:id="rId15"/>
+    <p:sldId id="272" r:id="rId16"/>
+    <p:sldId id="271" r:id="rId17"/>
   </p:sldIdLst>
   <p:sldSz cx="12192000" cy="6858000"/>
   <p:notesSz cx="6858000" cy="9144000"/>
@@ -226,7 +230,7 @@
           <a:p>
             <a:fld id="{14F3DC20-60EE-4AC4-A336-F3C5F824C6A0}" type="datetimeFigureOut">
               <a:rPr lang="zh-CN" altLang="en-US" smtClean="0"/>
-              <a:t>2024/3/22</a:t>
+              <a:t>2024/4/7</a:t>
             </a:fld>
             <a:endParaRPr lang="zh-CN" altLang="en-US"/>
           </a:p>
@@ -419,7 +423,7 @@
           <a:p>
             <a:fld id="{366AB279-2788-414B-AE10-F50EF6F25E65}" type="datetimeFigureOut">
               <a:rPr lang="zh-CN" altLang="en-US" smtClean="0"/>
-              <a:t>2024/3/22</a:t>
+              <a:t>2024/4/7</a:t>
             </a:fld>
             <a:endParaRPr lang="zh-CN" altLang="en-US"/>
           </a:p>
@@ -786,6 +790,90 @@
 </p:notes>
 </file>
 
+<file path=ppt/notesSlides/notesSlide2.xml><?xml version="1.0" encoding="utf-8"?>
+<p:notes xmlns:a="http://schemas.openxmlformats.org/drawingml/2006/main" xmlns:r="http://schemas.openxmlformats.org/officeDocument/2006/relationships" xmlns:p="http://schemas.openxmlformats.org/presentationml/2006/main">
+  <p:cSld>
+    <p:spTree>
+      <p:nvGrpSpPr>
+        <p:cNvPr id="1" name=""/>
+        <p:cNvGrpSpPr/>
+        <p:nvPr/>
+      </p:nvGrpSpPr>
+      <p:grpSpPr>
+        <a:xfrm>
+          <a:off x="0" y="0"/>
+          <a:ext cx="0" cy="0"/>
+          <a:chOff x="0" y="0"/>
+          <a:chExt cx="0" cy="0"/>
+        </a:xfrm>
+      </p:grpSpPr>
+      <p:sp>
+        <p:nvSpPr>
+          <p:cNvPr id="2" name="幻灯片图像占位符 1"/>
+          <p:cNvSpPr>
+            <a:spLocks noGrp="1" noRot="1" noChangeAspect="1"/>
+          </p:cNvSpPr>
+          <p:nvPr>
+            <p:ph type="sldImg"/>
+          </p:nvPr>
+        </p:nvSpPr>
+        <p:spPr/>
+      </p:sp>
+      <p:sp>
+        <p:nvSpPr>
+          <p:cNvPr id="3" name="备注占位符 2"/>
+          <p:cNvSpPr>
+            <a:spLocks noGrp="1"/>
+          </p:cNvSpPr>
+          <p:nvPr>
+            <p:ph type="body" idx="1"/>
+          </p:nvPr>
+        </p:nvSpPr>
+        <p:spPr/>
+        <p:txBody>
+          <a:bodyPr/>
+          <a:lstStyle/>
+          <a:p>
+            <a:endParaRPr lang="zh-CN" altLang="en-US" dirty="0"/>
+          </a:p>
+        </p:txBody>
+      </p:sp>
+      <p:sp>
+        <p:nvSpPr>
+          <p:cNvPr id="4" name="灯片编号占位符 3"/>
+          <p:cNvSpPr>
+            <a:spLocks noGrp="1"/>
+          </p:cNvSpPr>
+          <p:nvPr>
+            <p:ph type="sldNum" sz="quarter" idx="5"/>
+          </p:nvPr>
+        </p:nvSpPr>
+        <p:spPr/>
+        <p:txBody>
+          <a:bodyPr/>
+          <a:lstStyle/>
+          <a:p>
+            <a:fld id="{8E2D2D26-9484-4C06-9396-01068B3C1701}" type="slidenum">
+              <a:rPr lang="zh-CN" altLang="en-US" smtClean="0"/>
+              <a:t>15</a:t>
+            </a:fld>
+            <a:endParaRPr lang="zh-CN" altLang="en-US"/>
+          </a:p>
+        </p:txBody>
+      </p:sp>
+    </p:spTree>
+    <p:extLst>
+      <p:ext uri="{BB962C8B-B14F-4D97-AF65-F5344CB8AC3E}">
+        <p14:creationId xmlns:p14="http://schemas.microsoft.com/office/powerpoint/2010/main" val="1508435442"/>
+      </p:ext>
+    </p:extLst>
+  </p:cSld>
+  <p:clrMapOvr>
+    <a:masterClrMapping/>
+  </p:clrMapOvr>
+</p:notes>
+</file>
+
 <file path=ppt/slideLayouts/slideLayout1.xml><?xml version="1.0" encoding="utf-8"?>
 <p:sldLayout xmlns:a="http://schemas.openxmlformats.org/drawingml/2006/main" xmlns:r="http://schemas.openxmlformats.org/officeDocument/2006/relationships" xmlns:p="http://schemas.openxmlformats.org/presentationml/2006/main" type="title" preserve="1">
   <p:cSld name="标题幻灯片">
@@ -933,7 +1021,7 @@
           <a:p>
             <a:fld id="{15E169F2-D236-49A1-8FEA-62A763B8807F}" type="datetimeFigureOut">
               <a:rPr lang="zh-CN" altLang="en-US" smtClean="0"/>
-              <a:t>2024/3/22</a:t>
+              <a:t>2024/4/7</a:t>
             </a:fld>
             <a:endParaRPr lang="zh-CN" altLang="en-US"/>
           </a:p>
@@ -1131,7 +1219,7 @@
           <a:p>
             <a:fld id="{15E169F2-D236-49A1-8FEA-62A763B8807F}" type="datetimeFigureOut">
               <a:rPr lang="zh-CN" altLang="en-US" smtClean="0"/>
-              <a:t>2024/3/22</a:t>
+              <a:t>2024/4/7</a:t>
             </a:fld>
             <a:endParaRPr lang="zh-CN" altLang="en-US"/>
           </a:p>
@@ -1339,7 +1427,7 @@
           <a:p>
             <a:fld id="{15E169F2-D236-49A1-8FEA-62A763B8807F}" type="datetimeFigureOut">
               <a:rPr lang="zh-CN" altLang="en-US" smtClean="0"/>
-              <a:t>2024/3/22</a:t>
+              <a:t>2024/4/7</a:t>
             </a:fld>
             <a:endParaRPr lang="zh-CN" altLang="en-US"/>
           </a:p>
@@ -1537,7 +1625,7 @@
           <a:p>
             <a:fld id="{15E169F2-D236-49A1-8FEA-62A763B8807F}" type="datetimeFigureOut">
               <a:rPr lang="zh-CN" altLang="en-US" smtClean="0"/>
-              <a:t>2024/3/22</a:t>
+              <a:t>2024/4/7</a:t>
             </a:fld>
             <a:endParaRPr lang="zh-CN" altLang="en-US"/>
           </a:p>
@@ -1812,7 +1900,7 @@
           <a:p>
             <a:fld id="{15E169F2-D236-49A1-8FEA-62A763B8807F}" type="datetimeFigureOut">
               <a:rPr lang="zh-CN" altLang="en-US" smtClean="0"/>
-              <a:t>2024/3/22</a:t>
+              <a:t>2024/4/7</a:t>
             </a:fld>
             <a:endParaRPr lang="zh-CN" altLang="en-US"/>
           </a:p>
@@ -2077,7 +2165,7 @@
           <a:p>
             <a:fld id="{15E169F2-D236-49A1-8FEA-62A763B8807F}" type="datetimeFigureOut">
               <a:rPr lang="zh-CN" altLang="en-US" smtClean="0"/>
-              <a:t>2024/3/22</a:t>
+              <a:t>2024/4/7</a:t>
             </a:fld>
             <a:endParaRPr lang="zh-CN" altLang="en-US"/>
           </a:p>
@@ -2489,7 +2577,7 @@
           <a:p>
             <a:fld id="{15E169F2-D236-49A1-8FEA-62A763B8807F}" type="datetimeFigureOut">
               <a:rPr lang="zh-CN" altLang="en-US" smtClean="0"/>
-              <a:t>2024/3/22</a:t>
+              <a:t>2024/4/7</a:t>
             </a:fld>
             <a:endParaRPr lang="zh-CN" altLang="en-US"/>
           </a:p>
@@ -2630,7 +2718,7 @@
           <a:p>
             <a:fld id="{15E169F2-D236-49A1-8FEA-62A763B8807F}" type="datetimeFigureOut">
               <a:rPr lang="zh-CN" altLang="en-US" smtClean="0"/>
-              <a:t>2024/3/22</a:t>
+              <a:t>2024/4/7</a:t>
             </a:fld>
             <a:endParaRPr lang="zh-CN" altLang="en-US"/>
           </a:p>
@@ -2743,7 +2831,7 @@
           <a:p>
             <a:fld id="{15E169F2-D236-49A1-8FEA-62A763B8807F}" type="datetimeFigureOut">
               <a:rPr lang="zh-CN" altLang="en-US" smtClean="0"/>
-              <a:t>2024/3/22</a:t>
+              <a:t>2024/4/7</a:t>
             </a:fld>
             <a:endParaRPr lang="zh-CN" altLang="en-US"/>
           </a:p>
@@ -3054,7 +3142,7 @@
           <a:p>
             <a:fld id="{15E169F2-D236-49A1-8FEA-62A763B8807F}" type="datetimeFigureOut">
               <a:rPr lang="zh-CN" altLang="en-US" smtClean="0"/>
-              <a:t>2024/3/22</a:t>
+              <a:t>2024/4/7</a:t>
             </a:fld>
             <a:endParaRPr lang="zh-CN" altLang="en-US"/>
           </a:p>
@@ -3342,7 +3430,7 @@
           <a:p>
             <a:fld id="{15E169F2-D236-49A1-8FEA-62A763B8807F}" type="datetimeFigureOut">
               <a:rPr lang="zh-CN" altLang="en-US" smtClean="0"/>
-              <a:t>2024/3/22</a:t>
+              <a:t>2024/4/7</a:t>
             </a:fld>
             <a:endParaRPr lang="zh-CN" altLang="en-US"/>
           </a:p>
@@ -3583,7 +3671,7 @@
           <a:p>
             <a:fld id="{15E169F2-D236-49A1-8FEA-62A763B8807F}" type="datetimeFigureOut">
               <a:rPr lang="zh-CN" altLang="en-US" smtClean="0"/>
-              <a:t>2024/3/22</a:t>
+              <a:t>2024/4/7</a:t>
             </a:fld>
             <a:endParaRPr lang="zh-CN" altLang="en-US"/>
           </a:p>
@@ -4491,12 +4579,8 @@
               <a:t>对收集的新的测试用例修改 </a:t>
             </a:r>
             <a:r>
-              <a:rPr lang="en-US" altLang="zh-CN"/>
-              <a:t>semantic </a:t>
-            </a:r>
-            <a:r>
               <a:rPr lang="en-US" altLang="zh-CN" dirty="0"/>
-              <a:t>analyzer </a:t>
+              <a:t>semantic analyzer </a:t>
             </a:r>
           </a:p>
           <a:p>
@@ -4515,6 +4599,1028 @@
     <p:extLst>
       <p:ext uri="{BB962C8B-B14F-4D97-AF65-F5344CB8AC3E}">
         <p14:creationId xmlns:p14="http://schemas.microsoft.com/office/powerpoint/2010/main" val="49641479"/>
+      </p:ext>
+    </p:extLst>
+  </p:cSld>
+  <p:clrMapOvr>
+    <a:masterClrMapping/>
+  </p:clrMapOvr>
+</p:sld>
+</file>
+
+<file path=ppt/slides/slide13.xml><?xml version="1.0" encoding="utf-8"?>
+<p:sld xmlns:a="http://schemas.openxmlformats.org/drawingml/2006/main" xmlns:r="http://schemas.openxmlformats.org/officeDocument/2006/relationships" xmlns:p="http://schemas.openxmlformats.org/presentationml/2006/main">
+  <p:cSld>
+    <p:spTree>
+      <p:nvGrpSpPr>
+        <p:cNvPr id="1" name=""/>
+        <p:cNvGrpSpPr/>
+        <p:nvPr/>
+      </p:nvGrpSpPr>
+      <p:grpSpPr>
+        <a:xfrm>
+          <a:off x="0" y="0"/>
+          <a:ext cx="0" cy="0"/>
+          <a:chOff x="0" y="0"/>
+          <a:chExt cx="0" cy="0"/>
+        </a:xfrm>
+      </p:grpSpPr>
+      <p:sp>
+        <p:nvSpPr>
+          <p:cNvPr id="2" name="标题 1">
+            <a:extLst>
+              <a:ext uri="{FF2B5EF4-FFF2-40B4-BE49-F238E27FC236}">
+                <a16:creationId xmlns:a16="http://schemas.microsoft.com/office/drawing/2014/main" id="{D2FA7896-85B5-9AF5-3B3D-6CD68EC55CF6}"/>
+              </a:ext>
+            </a:extLst>
+          </p:cNvPr>
+          <p:cNvSpPr>
+            <a:spLocks noGrp="1"/>
+          </p:cNvSpPr>
+          <p:nvPr>
+            <p:ph type="title"/>
+          </p:nvPr>
+        </p:nvSpPr>
+        <p:spPr/>
+        <p:txBody>
+          <a:bodyPr/>
+          <a:lstStyle/>
+          <a:p>
+            <a:r>
+              <a:rPr lang="en-US" altLang="zh-CN" dirty="0"/>
+              <a:t>0323-0408</a:t>
+            </a:r>
+            <a:endParaRPr lang="zh-CN" altLang="en-US" dirty="0"/>
+          </a:p>
+        </p:txBody>
+      </p:sp>
+    </p:spTree>
+    <p:extLst>
+      <p:ext uri="{BB962C8B-B14F-4D97-AF65-F5344CB8AC3E}">
+        <p14:creationId xmlns:p14="http://schemas.microsoft.com/office/powerpoint/2010/main" val="1415773358"/>
+      </p:ext>
+    </p:extLst>
+  </p:cSld>
+  <p:clrMapOvr>
+    <a:masterClrMapping/>
+  </p:clrMapOvr>
+</p:sld>
+</file>
+
+<file path=ppt/slides/slide14.xml><?xml version="1.0" encoding="utf-8"?>
+<p:sld xmlns:a="http://schemas.openxmlformats.org/drawingml/2006/main" xmlns:r="http://schemas.openxmlformats.org/officeDocument/2006/relationships" xmlns:p="http://schemas.openxmlformats.org/presentationml/2006/main">
+  <p:cSld>
+    <p:spTree>
+      <p:nvGrpSpPr>
+        <p:cNvPr id="1" name=""/>
+        <p:cNvGrpSpPr/>
+        <p:nvPr/>
+      </p:nvGrpSpPr>
+      <p:grpSpPr>
+        <a:xfrm>
+          <a:off x="0" y="0"/>
+          <a:ext cx="0" cy="0"/>
+          <a:chOff x="0" y="0"/>
+          <a:chExt cx="0" cy="0"/>
+        </a:xfrm>
+      </p:grpSpPr>
+      <p:sp>
+        <p:nvSpPr>
+          <p:cNvPr id="2" name="标题 1">
+            <a:extLst>
+              <a:ext uri="{FF2B5EF4-FFF2-40B4-BE49-F238E27FC236}">
+                <a16:creationId xmlns:a16="http://schemas.microsoft.com/office/drawing/2014/main" id="{1B4E76D6-4324-86E4-DAEE-EA85A4C69701}"/>
+              </a:ext>
+            </a:extLst>
+          </p:cNvPr>
+          <p:cNvSpPr>
+            <a:spLocks noGrp="1"/>
+          </p:cNvSpPr>
+          <p:nvPr>
+            <p:ph type="title"/>
+          </p:nvPr>
+        </p:nvSpPr>
+        <p:spPr/>
+        <p:txBody>
+          <a:bodyPr/>
+          <a:lstStyle/>
+          <a:p>
+            <a:r>
+              <a:rPr lang="zh-CN" altLang="en-US" dirty="0"/>
+              <a:t>进展</a:t>
+            </a:r>
+          </a:p>
+        </p:txBody>
+      </p:sp>
+      <p:sp>
+        <p:nvSpPr>
+          <p:cNvPr id="3" name="内容占位符 2">
+            <a:extLst>
+              <a:ext uri="{FF2B5EF4-FFF2-40B4-BE49-F238E27FC236}">
+                <a16:creationId xmlns:a16="http://schemas.microsoft.com/office/drawing/2014/main" id="{446A344D-4CA5-2685-BCF6-0847F73ABAD7}"/>
+              </a:ext>
+            </a:extLst>
+          </p:cNvPr>
+          <p:cNvSpPr>
+            <a:spLocks noGrp="1"/>
+          </p:cNvSpPr>
+          <p:nvPr>
+            <p:ph idx="1"/>
+          </p:nvPr>
+        </p:nvSpPr>
+        <p:spPr/>
+        <p:txBody>
+          <a:bodyPr/>
+          <a:lstStyle/>
+          <a:p>
+            <a:r>
+              <a:rPr lang="zh-CN" altLang="en-US" dirty="0"/>
+              <a:t>体系结构</a:t>
+            </a:r>
+            <a:endParaRPr lang="en-US" altLang="zh-CN" dirty="0"/>
+          </a:p>
+          <a:p>
+            <a:pPr lvl="1"/>
+            <a:r>
+              <a:rPr lang="en-US" altLang="zh-CN" sz="2800" dirty="0"/>
+              <a:t>RL</a:t>
+            </a:r>
+          </a:p>
+          <a:p>
+            <a:pPr lvl="2"/>
+            <a:r>
+              <a:rPr lang="en-US" altLang="zh-CN" sz="2400" dirty="0">
+                <a:hlinkClick r:id="rId2"/>
+              </a:rPr>
+              <a:t>gymnasium</a:t>
+            </a:r>
+            <a:r>
+              <a:rPr lang="en-US" altLang="zh-CN" sz="2400" dirty="0"/>
+              <a:t> </a:t>
+            </a:r>
+            <a:r>
+              <a:rPr lang="zh-CN" altLang="en-US" sz="2400" dirty="0"/>
+              <a:t>用于创造环境</a:t>
+            </a:r>
+            <a:endParaRPr lang="en-US" altLang="zh-CN" sz="2400" dirty="0"/>
+          </a:p>
+          <a:p>
+            <a:pPr lvl="3"/>
+            <a:r>
+              <a:rPr lang="en-US" altLang="zh-CN" sz="2000" dirty="0"/>
+              <a:t>Gymnasium</a:t>
+            </a:r>
+            <a:r>
+              <a:rPr lang="zh-CN" altLang="en-US" sz="2000" dirty="0"/>
+              <a:t> 的优势在于可以对接多种 </a:t>
+            </a:r>
+            <a:r>
+              <a:rPr lang="en-US" altLang="zh-CN" sz="2000" dirty="0"/>
+              <a:t>RL</a:t>
+            </a:r>
+            <a:r>
+              <a:rPr lang="zh-CN" altLang="en-US" sz="2000" dirty="0"/>
+              <a:t> 的框架</a:t>
+            </a:r>
+            <a:endParaRPr lang="en-US" altLang="zh-CN" sz="2000" dirty="0"/>
+          </a:p>
+          <a:p>
+            <a:pPr lvl="3"/>
+            <a:r>
+              <a:rPr lang="zh-CN" altLang="en-US" sz="2000" dirty="0"/>
+              <a:t>根据定义定制环境，困难在 </a:t>
+            </a:r>
+            <a:r>
+              <a:rPr lang="en-US" altLang="zh-CN" sz="2000" dirty="0" err="1"/>
+              <a:t>action_space</a:t>
+            </a:r>
+            <a:r>
+              <a:rPr lang="en-US" altLang="zh-CN" sz="2000" dirty="0"/>
+              <a:t> </a:t>
+            </a:r>
+            <a:r>
+              <a:rPr lang="zh-CN" altLang="en-US" sz="2000" dirty="0"/>
+              <a:t>定义</a:t>
+            </a:r>
+            <a:endParaRPr lang="en-US" altLang="zh-CN" sz="2000" dirty="0"/>
+          </a:p>
+          <a:p>
+            <a:pPr lvl="2"/>
+            <a:r>
+              <a:rPr lang="en-US" altLang="zh-CN" sz="2400" dirty="0"/>
+              <a:t>RL </a:t>
+            </a:r>
+            <a:r>
+              <a:rPr lang="zh-CN" altLang="en-US" sz="2400" dirty="0"/>
+              <a:t>框架选择</a:t>
+            </a:r>
+            <a:endParaRPr lang="en-US" altLang="zh-CN" sz="2400" dirty="0"/>
+          </a:p>
+          <a:p>
+            <a:pPr lvl="3"/>
+            <a:r>
+              <a:rPr lang="en-US" altLang="zh-CN" sz="2000" dirty="0" err="1"/>
+              <a:t>tianshou</a:t>
+            </a:r>
+            <a:r>
+              <a:rPr lang="en-US" altLang="zh-CN" sz="2000" dirty="0"/>
+              <a:t> </a:t>
+            </a:r>
+          </a:p>
+          <a:p>
+            <a:pPr lvl="4"/>
+            <a:r>
+              <a:rPr lang="zh-CN" altLang="en-US" sz="2000" dirty="0"/>
+              <a:t>可以使用多种</a:t>
+            </a:r>
+            <a:r>
+              <a:rPr lang="en-US" altLang="zh-CN" sz="2000" dirty="0"/>
+              <a:t>RL</a:t>
+            </a:r>
+            <a:r>
+              <a:rPr lang="zh-CN" altLang="en-US" sz="2000" dirty="0"/>
+              <a:t>算法</a:t>
+            </a:r>
+            <a:endParaRPr lang="en-US" altLang="zh-CN" sz="2000" dirty="0"/>
+          </a:p>
+          <a:p>
+            <a:pPr lvl="1"/>
+            <a:r>
+              <a:rPr lang="en-US" altLang="zh-CN" dirty="0"/>
+              <a:t>Semantic analyzer</a:t>
+            </a:r>
+          </a:p>
+          <a:p>
+            <a:pPr marL="914400" lvl="2" indent="0">
+              <a:buNone/>
+            </a:pPr>
+            <a:r>
+              <a:rPr lang="en-US" altLang="zh-CN" dirty="0"/>
+              <a:t>… </a:t>
+            </a:r>
+            <a:endParaRPr lang="zh-CN" altLang="en-US" dirty="0"/>
+          </a:p>
+        </p:txBody>
+      </p:sp>
+      <p:pic>
+        <p:nvPicPr>
+          <p:cNvPr id="5" name="图片 4">
+            <a:extLst>
+              <a:ext uri="{FF2B5EF4-FFF2-40B4-BE49-F238E27FC236}">
+                <a16:creationId xmlns:a16="http://schemas.microsoft.com/office/drawing/2014/main" id="{D0CD4DB2-41E2-3716-AC79-6EC17C587CE3}"/>
+              </a:ext>
+            </a:extLst>
+          </p:cNvPr>
+          <p:cNvPicPr>
+            <a:picLocks noChangeAspect="1"/>
+          </p:cNvPicPr>
+          <p:nvPr/>
+        </p:nvPicPr>
+        <p:blipFill>
+          <a:blip r:embed="rId3"/>
+          <a:stretch>
+            <a:fillRect/>
+          </a:stretch>
+        </p:blipFill>
+        <p:spPr>
+          <a:xfrm>
+            <a:off x="8050924" y="3002270"/>
+            <a:ext cx="2543504" cy="3375434"/>
+          </a:xfrm>
+          <a:prstGeom prst="rect">
+            <a:avLst/>
+          </a:prstGeom>
+        </p:spPr>
+      </p:pic>
+      <p:pic>
+        <p:nvPicPr>
+          <p:cNvPr id="7" name="图片 6">
+            <a:extLst>
+              <a:ext uri="{FF2B5EF4-FFF2-40B4-BE49-F238E27FC236}">
+                <a16:creationId xmlns:a16="http://schemas.microsoft.com/office/drawing/2014/main" id="{945C68B0-95B9-6B2D-D0A7-060E905414DA}"/>
+              </a:ext>
+            </a:extLst>
+          </p:cNvPr>
+          <p:cNvPicPr>
+            <a:picLocks noChangeAspect="1"/>
+          </p:cNvPicPr>
+          <p:nvPr/>
+        </p:nvPicPr>
+        <p:blipFill>
+          <a:blip r:embed="rId4"/>
+          <a:stretch>
+            <a:fillRect/>
+          </a:stretch>
+        </p:blipFill>
+        <p:spPr>
+          <a:xfrm>
+            <a:off x="8106105" y="241753"/>
+            <a:ext cx="1592259" cy="2559776"/>
+          </a:xfrm>
+          <a:prstGeom prst="rect">
+            <a:avLst/>
+          </a:prstGeom>
+        </p:spPr>
+      </p:pic>
+      <p:pic>
+        <p:nvPicPr>
+          <p:cNvPr id="9" name="图片 8">
+            <a:extLst>
+              <a:ext uri="{FF2B5EF4-FFF2-40B4-BE49-F238E27FC236}">
+                <a16:creationId xmlns:a16="http://schemas.microsoft.com/office/drawing/2014/main" id="{06BF32E6-D4EC-DDC6-E26A-DC530A95F744}"/>
+              </a:ext>
+            </a:extLst>
+          </p:cNvPr>
+          <p:cNvPicPr>
+            <a:picLocks noChangeAspect="1"/>
+          </p:cNvPicPr>
+          <p:nvPr/>
+        </p:nvPicPr>
+        <p:blipFill>
+          <a:blip r:embed="rId5">
+            <a:extLst>
+              <a:ext uri="{28A0092B-C50C-407E-A947-70E740481C1C}">
+                <a14:useLocalDpi xmlns:a14="http://schemas.microsoft.com/office/drawing/2010/main" val="0"/>
+              </a:ext>
+            </a:extLst>
+          </a:blip>
+          <a:stretch>
+            <a:fillRect/>
+          </a:stretch>
+        </p:blipFill>
+        <p:spPr>
+          <a:xfrm>
+            <a:off x="1177682" y="5169522"/>
+            <a:ext cx="5926789" cy="1107811"/>
+          </a:xfrm>
+          <a:prstGeom prst="rect">
+            <a:avLst/>
+          </a:prstGeom>
+        </p:spPr>
+      </p:pic>
+      <p:cxnSp>
+        <p:nvCxnSpPr>
+          <p:cNvPr id="11" name="直接箭头连接符 10">
+            <a:extLst>
+              <a:ext uri="{FF2B5EF4-FFF2-40B4-BE49-F238E27FC236}">
+                <a16:creationId xmlns:a16="http://schemas.microsoft.com/office/drawing/2014/main" id="{3C334441-AC52-A891-5DA6-E8252CBB76D9}"/>
+              </a:ext>
+            </a:extLst>
+          </p:cNvPr>
+          <p:cNvCxnSpPr/>
+          <p:nvPr/>
+        </p:nvCxnSpPr>
+        <p:spPr>
+          <a:xfrm>
+            <a:off x="5312979" y="4093778"/>
+            <a:ext cx="2737945" cy="0"/>
+          </a:xfrm>
+          <a:prstGeom prst="straightConnector1">
+            <a:avLst/>
+          </a:prstGeom>
+          <a:ln w="28575">
+            <a:tailEnd type="triangle"/>
+          </a:ln>
+        </p:spPr>
+        <p:style>
+          <a:lnRef idx="1">
+            <a:schemeClr val="accent1"/>
+          </a:lnRef>
+          <a:fillRef idx="0">
+            <a:schemeClr val="accent1"/>
+          </a:fillRef>
+          <a:effectRef idx="0">
+            <a:schemeClr val="accent1"/>
+          </a:effectRef>
+          <a:fontRef idx="minor">
+            <a:schemeClr val="tx1"/>
+          </a:fontRef>
+        </p:style>
+      </p:cxnSp>
+    </p:spTree>
+    <p:extLst>
+      <p:ext uri="{BB962C8B-B14F-4D97-AF65-F5344CB8AC3E}">
+        <p14:creationId xmlns:p14="http://schemas.microsoft.com/office/powerpoint/2010/main" val="3745465413"/>
+      </p:ext>
+    </p:extLst>
+  </p:cSld>
+  <p:clrMapOvr>
+    <a:masterClrMapping/>
+  </p:clrMapOvr>
+</p:sld>
+</file>
+
+<file path=ppt/slides/slide15.xml><?xml version="1.0" encoding="utf-8"?>
+<p:sld xmlns:a="http://schemas.openxmlformats.org/drawingml/2006/main" xmlns:r="http://schemas.openxmlformats.org/officeDocument/2006/relationships" xmlns:p="http://schemas.openxmlformats.org/presentationml/2006/main">
+  <p:cSld>
+    <p:spTree>
+      <p:nvGrpSpPr>
+        <p:cNvPr id="1" name=""/>
+        <p:cNvGrpSpPr/>
+        <p:nvPr/>
+      </p:nvGrpSpPr>
+      <p:grpSpPr>
+        <a:xfrm>
+          <a:off x="0" y="0"/>
+          <a:ext cx="0" cy="0"/>
+          <a:chOff x="0" y="0"/>
+          <a:chExt cx="0" cy="0"/>
+        </a:xfrm>
+      </p:grpSpPr>
+      <p:grpSp>
+        <p:nvGrpSpPr>
+          <p:cNvPr id="13" name="组合 12">
+            <a:extLst>
+              <a:ext uri="{FF2B5EF4-FFF2-40B4-BE49-F238E27FC236}">
+                <a16:creationId xmlns:a16="http://schemas.microsoft.com/office/drawing/2014/main" id="{657D8381-BE94-E9B7-2D58-27175457132B}"/>
+              </a:ext>
+            </a:extLst>
+          </p:cNvPr>
+          <p:cNvGrpSpPr/>
+          <p:nvPr/>
+        </p:nvGrpSpPr>
+        <p:grpSpPr>
+          <a:xfrm>
+            <a:off x="3132304" y="361042"/>
+            <a:ext cx="5927392" cy="1107811"/>
+            <a:chOff x="2349584" y="271704"/>
+            <a:chExt cx="5927392" cy="1107811"/>
+          </a:xfrm>
+        </p:grpSpPr>
+        <p:pic>
+          <p:nvPicPr>
+            <p:cNvPr id="2" name="图片 1">
+              <a:extLst>
+                <a:ext uri="{FF2B5EF4-FFF2-40B4-BE49-F238E27FC236}">
+                  <a16:creationId xmlns:a16="http://schemas.microsoft.com/office/drawing/2014/main" id="{E7294E20-215C-EC6E-0373-A2565026C9A1}"/>
+                </a:ext>
+              </a:extLst>
+            </p:cNvPr>
+            <p:cNvPicPr>
+              <a:picLocks noChangeAspect="1"/>
+            </p:cNvPicPr>
+            <p:nvPr/>
+          </p:nvPicPr>
+          <p:blipFill>
+            <a:blip r:embed="rId3">
+              <a:extLst>
+                <a:ext uri="{28A0092B-C50C-407E-A947-70E740481C1C}">
+                  <a14:useLocalDpi xmlns:a14="http://schemas.microsoft.com/office/drawing/2010/main" val="0"/>
+                </a:ext>
+              </a:extLst>
+            </a:blip>
+            <a:stretch>
+              <a:fillRect/>
+            </a:stretch>
+          </p:blipFill>
+          <p:spPr>
+            <a:xfrm>
+              <a:off x="2349584" y="271704"/>
+              <a:ext cx="5926789" cy="1107811"/>
+            </a:xfrm>
+            <a:prstGeom prst="rect">
+              <a:avLst/>
+            </a:prstGeom>
+          </p:spPr>
+        </p:pic>
+        <p:sp>
+          <p:nvSpPr>
+            <p:cNvPr id="4" name="文本框 3">
+              <a:extLst>
+                <a:ext uri="{FF2B5EF4-FFF2-40B4-BE49-F238E27FC236}">
+                  <a16:creationId xmlns:a16="http://schemas.microsoft.com/office/drawing/2014/main" id="{5882404E-DB99-C2BA-335D-EC62706A5D5B}"/>
+                </a:ext>
+              </a:extLst>
+            </p:cNvPr>
+            <p:cNvSpPr txBox="1"/>
+            <p:nvPr/>
+          </p:nvSpPr>
+          <p:spPr>
+            <a:xfrm>
+              <a:off x="3032233" y="966954"/>
+              <a:ext cx="431528" cy="369332"/>
+            </a:xfrm>
+            <a:prstGeom prst="rect">
+              <a:avLst/>
+            </a:prstGeom>
+            <a:noFill/>
+          </p:spPr>
+          <p:txBody>
+            <a:bodyPr wrap="none" rtlCol="0">
+              <a:spAutoFit/>
+            </a:bodyPr>
+            <a:lstStyle/>
+            <a:p>
+              <a:r>
+                <a:rPr lang="en-US" altLang="zh-CN" dirty="0"/>
+                <a:t>str</a:t>
+              </a:r>
+              <a:endParaRPr lang="zh-CN" altLang="en-US" dirty="0"/>
+            </a:p>
+          </p:txBody>
+        </p:sp>
+        <p:sp>
+          <p:nvSpPr>
+            <p:cNvPr id="5" name="文本框 4">
+              <a:extLst>
+                <a:ext uri="{FF2B5EF4-FFF2-40B4-BE49-F238E27FC236}">
+                  <a16:creationId xmlns:a16="http://schemas.microsoft.com/office/drawing/2014/main" id="{6CFEA348-C5EC-1212-7843-2FBCADF2D7CF}"/>
+                </a:ext>
+              </a:extLst>
+            </p:cNvPr>
+            <p:cNvSpPr txBox="1"/>
+            <p:nvPr/>
+          </p:nvSpPr>
+          <p:spPr>
+            <a:xfrm>
+              <a:off x="7845448" y="940677"/>
+              <a:ext cx="431528" cy="369332"/>
+            </a:xfrm>
+            <a:prstGeom prst="rect">
+              <a:avLst/>
+            </a:prstGeom>
+            <a:noFill/>
+          </p:spPr>
+          <p:txBody>
+            <a:bodyPr wrap="none" rtlCol="0">
+              <a:spAutoFit/>
+            </a:bodyPr>
+            <a:lstStyle/>
+            <a:p>
+              <a:r>
+                <a:rPr lang="en-US" altLang="zh-CN" dirty="0"/>
+                <a:t>str</a:t>
+              </a:r>
+              <a:endParaRPr lang="zh-CN" altLang="en-US" dirty="0"/>
+            </a:p>
+          </p:txBody>
+        </p:sp>
+      </p:grpSp>
+      <p:sp>
+        <p:nvSpPr>
+          <p:cNvPr id="12" name="内容占位符 2">
+            <a:extLst>
+              <a:ext uri="{FF2B5EF4-FFF2-40B4-BE49-F238E27FC236}">
+                <a16:creationId xmlns:a16="http://schemas.microsoft.com/office/drawing/2014/main" id="{489B722B-0A15-368A-8056-8DE9133E86A2}"/>
+              </a:ext>
+            </a:extLst>
+          </p:cNvPr>
+          <p:cNvSpPr txBox="1">
+            <a:spLocks/>
+          </p:cNvSpPr>
+          <p:nvPr/>
+        </p:nvSpPr>
+        <p:spPr>
+          <a:xfrm>
+            <a:off x="838200" y="1808962"/>
+            <a:ext cx="10515600" cy="4935559"/>
+          </a:xfrm>
+          <a:prstGeom prst="rect">
+            <a:avLst/>
+          </a:prstGeom>
+        </p:spPr>
+        <p:txBody>
+          <a:bodyPr/>
+          <a:lstStyle>
+            <a:lvl1pPr marL="228600" indent="-228600" algn="l" defTabSz="914400" rtl="0" eaLnBrk="1" latinLnBrk="0" hangingPunct="1">
+              <a:lnSpc>
+                <a:spcPct val="90000"/>
+              </a:lnSpc>
+              <a:spcBef>
+                <a:spcPts val="1000"/>
+              </a:spcBef>
+              <a:buFont typeface="Arial" panose="020B0604020202020204" pitchFamily="34" charset="0"/>
+              <a:buChar char="•"/>
+              <a:defRPr sz="2800" kern="1200">
+                <a:solidFill>
+                  <a:schemeClr val="tx1"/>
+                </a:solidFill>
+                <a:latin typeface="Calibri" panose="020F0502020204030204" pitchFamily="34" charset="0"/>
+                <a:ea typeface="黑体" panose="02010609060101010101" pitchFamily="49" charset="-122"/>
+                <a:cs typeface="Calibri" panose="020F0502020204030204" pitchFamily="34" charset="0"/>
+              </a:defRPr>
+            </a:lvl1pPr>
+            <a:lvl2pPr marL="685800" indent="-228600" algn="l" defTabSz="914400" rtl="0" eaLnBrk="1" latinLnBrk="0" hangingPunct="1">
+              <a:lnSpc>
+                <a:spcPct val="90000"/>
+              </a:lnSpc>
+              <a:spcBef>
+                <a:spcPts val="500"/>
+              </a:spcBef>
+              <a:buFont typeface="Arial" panose="020B0604020202020204" pitchFamily="34" charset="0"/>
+              <a:buChar char="•"/>
+              <a:defRPr sz="2400" kern="1200">
+                <a:solidFill>
+                  <a:schemeClr val="tx1"/>
+                </a:solidFill>
+                <a:latin typeface="Calibri" panose="020F0502020204030204" pitchFamily="34" charset="0"/>
+                <a:ea typeface="黑体" panose="02010609060101010101" pitchFamily="49" charset="-122"/>
+                <a:cs typeface="Calibri" panose="020F0502020204030204" pitchFamily="34" charset="0"/>
+              </a:defRPr>
+            </a:lvl2pPr>
+            <a:lvl3pPr marL="1143000" indent="-228600" algn="l" defTabSz="914400" rtl="0" eaLnBrk="1" latinLnBrk="0" hangingPunct="1">
+              <a:lnSpc>
+                <a:spcPct val="90000"/>
+              </a:lnSpc>
+              <a:spcBef>
+                <a:spcPts val="500"/>
+              </a:spcBef>
+              <a:buFont typeface="Arial" panose="020B0604020202020204" pitchFamily="34" charset="0"/>
+              <a:buChar char="•"/>
+              <a:defRPr sz="2000" kern="1200">
+                <a:solidFill>
+                  <a:schemeClr val="tx1"/>
+                </a:solidFill>
+                <a:latin typeface="Calibri" panose="020F0502020204030204" pitchFamily="34" charset="0"/>
+                <a:ea typeface="黑体" panose="02010609060101010101" pitchFamily="49" charset="-122"/>
+                <a:cs typeface="Calibri" panose="020F0502020204030204" pitchFamily="34" charset="0"/>
+              </a:defRPr>
+            </a:lvl3pPr>
+            <a:lvl4pPr marL="1600200" indent="-228600" algn="l" defTabSz="914400" rtl="0" eaLnBrk="1" latinLnBrk="0" hangingPunct="1">
+              <a:lnSpc>
+                <a:spcPct val="90000"/>
+              </a:lnSpc>
+              <a:spcBef>
+                <a:spcPts val="500"/>
+              </a:spcBef>
+              <a:buFont typeface="Arial" panose="020B0604020202020204" pitchFamily="34" charset="0"/>
+              <a:buChar char="•"/>
+              <a:defRPr sz="1800" kern="1200">
+                <a:solidFill>
+                  <a:schemeClr val="tx1"/>
+                </a:solidFill>
+                <a:latin typeface="Calibri" panose="020F0502020204030204" pitchFamily="34" charset="0"/>
+                <a:ea typeface="黑体" panose="02010609060101010101" pitchFamily="49" charset="-122"/>
+                <a:cs typeface="Calibri" panose="020F0502020204030204" pitchFamily="34" charset="0"/>
+              </a:defRPr>
+            </a:lvl4pPr>
+            <a:lvl5pPr marL="2057400" indent="-228600" algn="l" defTabSz="914400" rtl="0" eaLnBrk="1" latinLnBrk="0" hangingPunct="1">
+              <a:lnSpc>
+                <a:spcPct val="90000"/>
+              </a:lnSpc>
+              <a:spcBef>
+                <a:spcPts val="500"/>
+              </a:spcBef>
+              <a:buFont typeface="Arial" panose="020B0604020202020204" pitchFamily="34" charset="0"/>
+              <a:buChar char="•"/>
+              <a:defRPr sz="1800" kern="1200">
+                <a:solidFill>
+                  <a:schemeClr val="tx1"/>
+                </a:solidFill>
+                <a:latin typeface="Calibri" panose="020F0502020204030204" pitchFamily="34" charset="0"/>
+                <a:ea typeface="黑体" panose="02010609060101010101" pitchFamily="49" charset="-122"/>
+                <a:cs typeface="Calibri" panose="020F0502020204030204" pitchFamily="34" charset="0"/>
+              </a:defRPr>
+            </a:lvl5pPr>
+            <a:lvl6pPr marL="2514600" indent="-228600" algn="l" defTabSz="914400" rtl="0" eaLnBrk="1" latinLnBrk="0" hangingPunct="1">
+              <a:lnSpc>
+                <a:spcPct val="90000"/>
+              </a:lnSpc>
+              <a:spcBef>
+                <a:spcPts val="500"/>
+              </a:spcBef>
+              <a:buFont typeface="Arial" panose="020B0604020202020204" pitchFamily="34" charset="0"/>
+              <a:buChar char="•"/>
+              <a:defRPr sz="1800" kern="1200">
+                <a:solidFill>
+                  <a:schemeClr val="tx1"/>
+                </a:solidFill>
+                <a:latin typeface="+mn-lt"/>
+                <a:ea typeface="+mn-ea"/>
+                <a:cs typeface="+mn-cs"/>
+              </a:defRPr>
+            </a:lvl6pPr>
+            <a:lvl7pPr marL="2971800" indent="-228600" algn="l" defTabSz="914400" rtl="0" eaLnBrk="1" latinLnBrk="0" hangingPunct="1">
+              <a:lnSpc>
+                <a:spcPct val="90000"/>
+              </a:lnSpc>
+              <a:spcBef>
+                <a:spcPts val="500"/>
+              </a:spcBef>
+              <a:buFont typeface="Arial" panose="020B0604020202020204" pitchFamily="34" charset="0"/>
+              <a:buChar char="•"/>
+              <a:defRPr sz="1800" kern="1200">
+                <a:solidFill>
+                  <a:schemeClr val="tx1"/>
+                </a:solidFill>
+                <a:latin typeface="+mn-lt"/>
+                <a:ea typeface="+mn-ea"/>
+                <a:cs typeface="+mn-cs"/>
+              </a:defRPr>
+            </a:lvl7pPr>
+            <a:lvl8pPr marL="3429000" indent="-228600" algn="l" defTabSz="914400" rtl="0" eaLnBrk="1" latinLnBrk="0" hangingPunct="1">
+              <a:lnSpc>
+                <a:spcPct val="90000"/>
+              </a:lnSpc>
+              <a:spcBef>
+                <a:spcPts val="500"/>
+              </a:spcBef>
+              <a:buFont typeface="Arial" panose="020B0604020202020204" pitchFamily="34" charset="0"/>
+              <a:buChar char="•"/>
+              <a:defRPr sz="1800" kern="1200">
+                <a:solidFill>
+                  <a:schemeClr val="tx1"/>
+                </a:solidFill>
+                <a:latin typeface="+mn-lt"/>
+                <a:ea typeface="+mn-ea"/>
+                <a:cs typeface="+mn-cs"/>
+              </a:defRPr>
+            </a:lvl8pPr>
+            <a:lvl9pPr marL="3886200" indent="-228600" algn="l" defTabSz="914400" rtl="0" eaLnBrk="1" latinLnBrk="0" hangingPunct="1">
+              <a:lnSpc>
+                <a:spcPct val="90000"/>
+              </a:lnSpc>
+              <a:spcBef>
+                <a:spcPts val="500"/>
+              </a:spcBef>
+              <a:buFont typeface="Arial" panose="020B0604020202020204" pitchFamily="34" charset="0"/>
+              <a:buChar char="•"/>
+              <a:defRPr sz="1800" kern="1200">
+                <a:solidFill>
+                  <a:schemeClr val="tx1"/>
+                </a:solidFill>
+                <a:latin typeface="+mn-lt"/>
+                <a:ea typeface="+mn-ea"/>
+                <a:cs typeface="+mn-cs"/>
+              </a:defRPr>
+            </a:lvl9pPr>
+          </a:lstStyle>
+          <a:p>
+            <a:r>
+              <a:rPr lang="zh-CN" altLang="en-US" dirty="0"/>
+              <a:t>本质上是从 </a:t>
+            </a:r>
+            <a:r>
+              <a:rPr lang="en-US" altLang="zh-CN" dirty="0"/>
+              <a:t>str </a:t>
+            </a:r>
+            <a:r>
+              <a:rPr lang="zh-CN" altLang="en-US" dirty="0"/>
+              <a:t>到 </a:t>
+            </a:r>
+            <a:r>
+              <a:rPr lang="en-US" altLang="zh-CN" dirty="0"/>
+              <a:t>str </a:t>
+            </a:r>
+            <a:r>
+              <a:rPr lang="zh-CN" altLang="en-US" dirty="0"/>
+              <a:t>的运算</a:t>
+            </a:r>
+            <a:endParaRPr lang="en-US" altLang="zh-CN" dirty="0"/>
+          </a:p>
+          <a:p>
+            <a:pPr lvl="1"/>
+            <a:r>
+              <a:rPr lang="zh-CN" altLang="en-US" dirty="0"/>
+              <a:t>输出的结果</a:t>
+            </a:r>
+            <a:endParaRPr lang="en-US" altLang="zh-CN" dirty="0"/>
+          </a:p>
+          <a:p>
+            <a:pPr lvl="2"/>
+            <a:r>
+              <a:rPr lang="zh-CN" altLang="en-US" dirty="0"/>
+              <a:t>需要满足一阶逻辑谓词表达式复合的形式</a:t>
+            </a:r>
+            <a:endParaRPr lang="en-US" altLang="zh-CN" dirty="0"/>
+          </a:p>
+          <a:p>
+            <a:pPr lvl="3"/>
+            <a:r>
+              <a:rPr lang="zh-CN" altLang="en-US" dirty="0"/>
+              <a:t>通过 </a:t>
+            </a:r>
+            <a:r>
+              <a:rPr lang="en-US" altLang="zh-CN" dirty="0" err="1"/>
+              <a:t>action_space</a:t>
+            </a:r>
+            <a:r>
+              <a:rPr lang="en-US" altLang="zh-CN" dirty="0"/>
+              <a:t> </a:t>
+            </a:r>
+            <a:r>
+              <a:rPr lang="zh-CN" altLang="en-US" dirty="0"/>
+              <a:t>控制</a:t>
+            </a:r>
+            <a:endParaRPr lang="en-US" altLang="zh-CN" dirty="0"/>
+          </a:p>
+          <a:p>
+            <a:pPr lvl="2"/>
+            <a:r>
+              <a:rPr lang="zh-CN" altLang="en-US" dirty="0"/>
+              <a:t>需要有一定的意义：是 </a:t>
+            </a:r>
+            <a:r>
+              <a:rPr lang="en-US" altLang="zh-CN" dirty="0"/>
+              <a:t>inductive invariant</a:t>
+            </a:r>
+          </a:p>
+          <a:p>
+            <a:pPr lvl="3"/>
+            <a:r>
+              <a:rPr lang="zh-CN" altLang="en-US" dirty="0"/>
+              <a:t>通过 </a:t>
+            </a:r>
+            <a:r>
+              <a:rPr lang="en-US" altLang="zh-CN" dirty="0" err="1"/>
+              <a:t>rl</a:t>
+            </a:r>
+            <a:r>
+              <a:rPr lang="en-US" altLang="zh-CN" dirty="0"/>
+              <a:t> </a:t>
+            </a:r>
+            <a:r>
+              <a:rPr lang="zh-CN" altLang="en-US" dirty="0"/>
+              <a:t>反馈更新</a:t>
+            </a:r>
+          </a:p>
+        </p:txBody>
+      </p:sp>
+      <p:pic>
+        <p:nvPicPr>
+          <p:cNvPr id="1026" name="Picture 2">
+            <a:extLst>
+              <a:ext uri="{FF2B5EF4-FFF2-40B4-BE49-F238E27FC236}">
+                <a16:creationId xmlns:a16="http://schemas.microsoft.com/office/drawing/2014/main" id="{802B9977-189D-CF58-3139-43CA97E26178}"/>
+              </a:ext>
+            </a:extLst>
+          </p:cNvPr>
+          <p:cNvPicPr>
+            <a:picLocks noChangeAspect="1" noChangeArrowheads="1"/>
+          </p:cNvPicPr>
+          <p:nvPr/>
+        </p:nvPicPr>
+        <p:blipFill>
+          <a:blip r:embed="rId4">
+            <a:extLst>
+              <a:ext uri="{28A0092B-C50C-407E-A947-70E740481C1C}">
+                <a14:useLocalDpi xmlns:a14="http://schemas.microsoft.com/office/drawing/2010/main" val="0"/>
+              </a:ext>
+            </a:extLst>
+          </a:blip>
+          <a:srcRect/>
+          <a:stretch>
+            <a:fillRect/>
+          </a:stretch>
+        </p:blipFill>
+        <p:spPr bwMode="auto">
+          <a:xfrm>
+            <a:off x="7511721" y="3521414"/>
+            <a:ext cx="2861989" cy="2474738"/>
+          </a:xfrm>
+          <a:prstGeom prst="rect">
+            <a:avLst/>
+          </a:prstGeom>
+          <a:noFill/>
+          <a:extLst>
+            <a:ext uri="{909E8E84-426E-40DD-AFC4-6F175D3DCCD1}">
+              <a14:hiddenFill xmlns:a14="http://schemas.microsoft.com/office/drawing/2010/main">
+                <a:solidFill>
+                  <a:srgbClr val="FFFFFF"/>
+                </a:solidFill>
+              </a14:hiddenFill>
+            </a:ext>
+          </a:extLst>
+        </p:spPr>
+      </p:pic>
+    </p:spTree>
+    <p:extLst>
+      <p:ext uri="{BB962C8B-B14F-4D97-AF65-F5344CB8AC3E}">
+        <p14:creationId xmlns:p14="http://schemas.microsoft.com/office/powerpoint/2010/main" val="2535803775"/>
+      </p:ext>
+    </p:extLst>
+  </p:cSld>
+  <p:clrMapOvr>
+    <a:masterClrMapping/>
+  </p:clrMapOvr>
+</p:sld>
+</file>
+
+<file path=ppt/slides/slide16.xml><?xml version="1.0" encoding="utf-8"?>
+<p:sld xmlns:a="http://schemas.openxmlformats.org/drawingml/2006/main" xmlns:r="http://schemas.openxmlformats.org/officeDocument/2006/relationships" xmlns:p="http://schemas.openxmlformats.org/presentationml/2006/main">
+  <p:cSld>
+    <p:spTree>
+      <p:nvGrpSpPr>
+        <p:cNvPr id="1" name=""/>
+        <p:cNvGrpSpPr/>
+        <p:nvPr/>
+      </p:nvGrpSpPr>
+      <p:grpSpPr>
+        <a:xfrm>
+          <a:off x="0" y="0"/>
+          <a:ext cx="0" cy="0"/>
+          <a:chOff x="0" y="0"/>
+          <a:chExt cx="0" cy="0"/>
+        </a:xfrm>
+      </p:grpSpPr>
+      <p:sp>
+        <p:nvSpPr>
+          <p:cNvPr id="2" name="标题 1">
+            <a:extLst>
+              <a:ext uri="{FF2B5EF4-FFF2-40B4-BE49-F238E27FC236}">
+                <a16:creationId xmlns:a16="http://schemas.microsoft.com/office/drawing/2014/main" id="{E7BE035D-5A78-555F-2ACA-3A3138AB81D9}"/>
+              </a:ext>
+            </a:extLst>
+          </p:cNvPr>
+          <p:cNvSpPr>
+            <a:spLocks noGrp="1"/>
+          </p:cNvSpPr>
+          <p:nvPr>
+            <p:ph type="title"/>
+          </p:nvPr>
+        </p:nvSpPr>
+        <p:spPr/>
+        <p:txBody>
+          <a:bodyPr/>
+          <a:lstStyle/>
+          <a:p>
+            <a:r>
+              <a:rPr lang="zh-CN" altLang="en-US" dirty="0"/>
+              <a:t>问题</a:t>
+            </a:r>
+          </a:p>
+        </p:txBody>
+      </p:sp>
+      <p:sp>
+        <p:nvSpPr>
+          <p:cNvPr id="3" name="内容占位符 2">
+            <a:extLst>
+              <a:ext uri="{FF2B5EF4-FFF2-40B4-BE49-F238E27FC236}">
+                <a16:creationId xmlns:a16="http://schemas.microsoft.com/office/drawing/2014/main" id="{3ACAC6E9-AF37-F1EE-9C87-3FE9C8825D49}"/>
+              </a:ext>
+            </a:extLst>
+          </p:cNvPr>
+          <p:cNvSpPr>
+            <a:spLocks noGrp="1"/>
+          </p:cNvSpPr>
+          <p:nvPr>
+            <p:ph idx="1"/>
+          </p:nvPr>
+        </p:nvSpPr>
+        <p:spPr/>
+        <p:txBody>
+          <a:bodyPr/>
+          <a:lstStyle/>
+          <a:p>
+            <a:r>
+              <a:rPr lang="zh-CN" altLang="en-US" dirty="0"/>
+              <a:t>需要更多的测试用例 </a:t>
+            </a:r>
+            <a:r>
+              <a:rPr lang="en-US" altLang="zh-CN" dirty="0"/>
+              <a:t>/ </a:t>
+            </a:r>
+            <a:r>
+              <a:rPr lang="zh-CN" altLang="en-US" dirty="0"/>
+              <a:t>测试集</a:t>
+            </a:r>
+            <a:endParaRPr lang="en-US" altLang="zh-CN" dirty="0"/>
+          </a:p>
+          <a:p>
+            <a:pPr lvl="1"/>
+            <a:r>
+              <a:rPr lang="zh-CN" altLang="en-US" dirty="0"/>
+              <a:t>目前只有来自于 </a:t>
+            </a:r>
+            <a:r>
+              <a:rPr lang="en-US" altLang="zh-CN" dirty="0"/>
+              <a:t>endive </a:t>
+            </a:r>
+            <a:r>
+              <a:rPr lang="zh-CN" altLang="en-US" dirty="0"/>
+              <a:t>的 </a:t>
+            </a:r>
+            <a:r>
+              <a:rPr lang="en-US" altLang="zh-CN" dirty="0"/>
+              <a:t>34 </a:t>
+            </a:r>
+            <a:r>
+              <a:rPr lang="zh-CN" altLang="en-US" dirty="0"/>
+              <a:t>个 </a:t>
+            </a:r>
+            <a:r>
+              <a:rPr lang="en-US" altLang="zh-CN" dirty="0" err="1"/>
+              <a:t>tla</a:t>
+            </a:r>
+            <a:r>
+              <a:rPr lang="en-US" altLang="zh-CN" dirty="0"/>
+              <a:t> </a:t>
+            </a:r>
+            <a:r>
+              <a:rPr lang="zh-CN" altLang="en-US" dirty="0"/>
+              <a:t>协议</a:t>
+            </a:r>
+            <a:endParaRPr lang="en-US" altLang="zh-CN" dirty="0"/>
+          </a:p>
+          <a:p>
+            <a:endParaRPr lang="zh-CN" altLang="en-US" dirty="0"/>
+          </a:p>
+        </p:txBody>
+      </p:sp>
+    </p:spTree>
+    <p:extLst>
+      <p:ext uri="{BB962C8B-B14F-4D97-AF65-F5344CB8AC3E}">
+        <p14:creationId xmlns:p14="http://schemas.microsoft.com/office/powerpoint/2010/main" val="1587758203"/>
       </p:ext>
     </p:extLst>
   </p:cSld>

</xml_diff>